<commit_message>
Independent modules of all working components
</commit_message>
<xml_diff>
--- a/new_code/input/title.pptx
+++ b/new_code/input/title.pptx
@@ -6,7 +6,6 @@
   </p:sldMasterIdLst>
   <p:sldIdLst>
     <p:sldId id="256" r:id="rId2"/>
-    <p:sldId id="257" r:id="rId3"/>
   </p:sldIdLst>
   <p:sldSz cx="12192000" cy="6858000"/>
   <p:notesSz cx="6858000" cy="9144000"/>
@@ -835,7 +834,7 @@
           <a:p>
             <a:fld id="{6A344F3F-5B12-4708-A854-BAFF166395C9}" type="datetimeFigureOut">
               <a:rPr lang="en-IN" smtClean="0"/>
-              <a:t>30-06-2023</a:t>
+              <a:t>13-08-2023</a:t>
             </a:fld>
             <a:endParaRPr lang="en-IN"/>
           </a:p>
@@ -1086,7 +1085,7 @@
           <a:p>
             <a:fld id="{6A344F3F-5B12-4708-A854-BAFF166395C9}" type="datetimeFigureOut">
               <a:rPr lang="en-IN" smtClean="0"/>
-              <a:t>30-06-2023</a:t>
+              <a:t>13-08-2023</a:t>
             </a:fld>
             <a:endParaRPr lang="en-IN"/>
           </a:p>
@@ -1400,7 +1399,7 @@
           <a:p>
             <a:fld id="{6A344F3F-5B12-4708-A854-BAFF166395C9}" type="datetimeFigureOut">
               <a:rPr lang="en-IN" smtClean="0"/>
-              <a:t>30-06-2023</a:t>
+              <a:t>13-08-2023</a:t>
             </a:fld>
             <a:endParaRPr lang="en-IN"/>
           </a:p>
@@ -1741,7 +1740,7 @@
           <a:p>
             <a:fld id="{6A344F3F-5B12-4708-A854-BAFF166395C9}" type="datetimeFigureOut">
               <a:rPr lang="en-IN" smtClean="0"/>
-              <a:t>30-06-2023</a:t>
+              <a:t>13-08-2023</a:t>
             </a:fld>
             <a:endParaRPr lang="en-IN"/>
           </a:p>
@@ -2055,7 +2054,7 @@
           <a:p>
             <a:fld id="{6A344F3F-5B12-4708-A854-BAFF166395C9}" type="datetimeFigureOut">
               <a:rPr lang="en-IN" smtClean="0"/>
-              <a:t>30-06-2023</a:t>
+              <a:t>13-08-2023</a:t>
             </a:fld>
             <a:endParaRPr lang="en-IN"/>
           </a:p>
@@ -2448,7 +2447,7 @@
           <a:p>
             <a:fld id="{6A344F3F-5B12-4708-A854-BAFF166395C9}" type="datetimeFigureOut">
               <a:rPr lang="en-IN" smtClean="0"/>
-              <a:t>30-06-2023</a:t>
+              <a:t>13-08-2023</a:t>
             </a:fld>
             <a:endParaRPr lang="en-IN"/>
           </a:p>
@@ -2618,7 +2617,7 @@
           <a:p>
             <a:fld id="{6A344F3F-5B12-4708-A854-BAFF166395C9}" type="datetimeFigureOut">
               <a:rPr lang="en-IN" smtClean="0"/>
-              <a:t>30-06-2023</a:t>
+              <a:t>13-08-2023</a:t>
             </a:fld>
             <a:endParaRPr lang="en-IN"/>
           </a:p>
@@ -2798,7 +2797,7 @@
           <a:p>
             <a:fld id="{6A344F3F-5B12-4708-A854-BAFF166395C9}" type="datetimeFigureOut">
               <a:rPr lang="en-IN" smtClean="0"/>
-              <a:t>30-06-2023</a:t>
+              <a:t>13-08-2023</a:t>
             </a:fld>
             <a:endParaRPr lang="en-IN"/>
           </a:p>
@@ -2974,7 +2973,7 @@
           <a:p>
             <a:fld id="{6A344F3F-5B12-4708-A854-BAFF166395C9}" type="datetimeFigureOut">
               <a:rPr lang="en-IN" smtClean="0"/>
-              <a:t>30-06-2023</a:t>
+              <a:t>13-08-2023</a:t>
             </a:fld>
             <a:endParaRPr lang="en-IN"/>
           </a:p>
@@ -3221,7 +3220,7 @@
           <a:p>
             <a:fld id="{6A344F3F-5B12-4708-A854-BAFF166395C9}" type="datetimeFigureOut">
               <a:rPr lang="en-IN" smtClean="0"/>
-              <a:t>30-06-2023</a:t>
+              <a:t>13-08-2023</a:t>
             </a:fld>
             <a:endParaRPr lang="en-IN"/>
           </a:p>
@@ -3453,7 +3452,7 @@
           <a:p>
             <a:fld id="{6A344F3F-5B12-4708-A854-BAFF166395C9}" type="datetimeFigureOut">
               <a:rPr lang="en-IN" smtClean="0"/>
-              <a:t>30-06-2023</a:t>
+              <a:t>13-08-2023</a:t>
             </a:fld>
             <a:endParaRPr lang="en-IN"/>
           </a:p>
@@ -3827,7 +3826,7 @@
           <a:p>
             <a:fld id="{6A344F3F-5B12-4708-A854-BAFF166395C9}" type="datetimeFigureOut">
               <a:rPr lang="en-IN" smtClean="0"/>
-              <a:t>30-06-2023</a:t>
+              <a:t>13-08-2023</a:t>
             </a:fld>
             <a:endParaRPr lang="en-IN"/>
           </a:p>
@@ -3950,7 +3949,7 @@
           <a:p>
             <a:fld id="{6A344F3F-5B12-4708-A854-BAFF166395C9}" type="datetimeFigureOut">
               <a:rPr lang="en-IN" smtClean="0"/>
-              <a:t>30-06-2023</a:t>
+              <a:t>13-08-2023</a:t>
             </a:fld>
             <a:endParaRPr lang="en-IN"/>
           </a:p>
@@ -4045,7 +4044,7 @@
           <a:p>
             <a:fld id="{6A344F3F-5B12-4708-A854-BAFF166395C9}" type="datetimeFigureOut">
               <a:rPr lang="en-IN" smtClean="0"/>
-              <a:t>30-06-2023</a:t>
+              <a:t>13-08-2023</a:t>
             </a:fld>
             <a:endParaRPr lang="en-IN"/>
           </a:p>
@@ -4300,7 +4299,7 @@
           <a:p>
             <a:fld id="{6A344F3F-5B12-4708-A854-BAFF166395C9}" type="datetimeFigureOut">
               <a:rPr lang="en-IN" smtClean="0"/>
-              <a:t>30-06-2023</a:t>
+              <a:t>13-08-2023</a:t>
             </a:fld>
             <a:endParaRPr lang="en-IN"/>
           </a:p>
@@ -4563,7 +4562,7 @@
           <a:p>
             <a:fld id="{6A344F3F-5B12-4708-A854-BAFF166395C9}" type="datetimeFigureOut">
               <a:rPr lang="en-IN" smtClean="0"/>
-              <a:t>30-06-2023</a:t>
+              <a:t>13-08-2023</a:t>
             </a:fld>
             <a:endParaRPr lang="en-IN"/>
           </a:p>
@@ -5306,7 +5305,7 @@
           <a:p>
             <a:fld id="{6A344F3F-5B12-4708-A854-BAFF166395C9}" type="datetimeFigureOut">
               <a:rPr lang="en-IN" smtClean="0"/>
-              <a:t>30-06-2023</a:t>
+              <a:t>13-08-2023</a:t>
             </a:fld>
             <a:endParaRPr lang="en-IN"/>
           </a:p>
@@ -5851,7 +5850,14 @@
           <a:bodyPr/>
           <a:lstStyle/>
           <a:p>
-            <a:endParaRPr lang="en-IN"/>
+            <a:r>
+              <a:rPr lang="en-IN" dirty="0"/>
+              <a:t>This is </a:t>
+            </a:r>
+            <a:r>
+              <a:rPr lang="en-IN"/>
+              <a:t>a slide</a:t>
+            </a:r>
           </a:p>
         </p:txBody>
       </p:sp>
@@ -5876,7 +5882,14 @@
           <a:bodyPr/>
           <a:lstStyle/>
           <a:p>
-            <a:endParaRPr lang="en-IN"/>
+            <a:r>
+              <a:rPr lang="en-IN" dirty="0"/>
+              <a:t>Hi this </a:t>
+            </a:r>
+            <a:r>
+              <a:rPr lang="en-IN"/>
+              <a:t>is trial</a:t>
+            </a:r>
           </a:p>
         </p:txBody>
       </p:sp>
@@ -5884,93 +5897,6 @@
     <p:extLst>
       <p:ext uri="{BB962C8B-B14F-4D97-AF65-F5344CB8AC3E}">
         <p14:creationId xmlns:p14="http://schemas.microsoft.com/office/powerpoint/2010/main" val="2711736745"/>
-      </p:ext>
-    </p:extLst>
-  </p:cSld>
-  <p:clrMapOvr>
-    <a:masterClrMapping/>
-  </p:clrMapOvr>
-</p:sld>
-</file>
-
-<file path=ppt/slides/slide2.xml><?xml version="1.0" encoding="utf-8"?>
-<p:sld xmlns:a="http://schemas.openxmlformats.org/drawingml/2006/main" xmlns:r="http://schemas.openxmlformats.org/officeDocument/2006/relationships" xmlns:p="http://schemas.openxmlformats.org/presentationml/2006/main">
-  <p:cSld>
-    <p:spTree>
-      <p:nvGrpSpPr>
-        <p:cNvPr id="1" name=""/>
-        <p:cNvGrpSpPr/>
-        <p:nvPr/>
-      </p:nvGrpSpPr>
-      <p:grpSpPr>
-        <a:xfrm>
-          <a:off x="0" y="0"/>
-          <a:ext cx="0" cy="0"/>
-          <a:chOff x="0" y="0"/>
-          <a:chExt cx="0" cy="0"/>
-        </a:xfrm>
-      </p:grpSpPr>
-      <p:sp>
-        <p:nvSpPr>
-          <p:cNvPr id="2" name="Title 1">
-            <a:extLst>
-              <a:ext uri="{FF2B5EF4-FFF2-40B4-BE49-F238E27FC236}">
-                <a16:creationId xmlns:a16="http://schemas.microsoft.com/office/drawing/2014/main" id="{C5C73069-A061-F82E-303B-B570F4EFD41C}"/>
-              </a:ext>
-            </a:extLst>
-          </p:cNvPr>
-          <p:cNvSpPr>
-            <a:spLocks noGrp="1"/>
-          </p:cNvSpPr>
-          <p:nvPr>
-            <p:ph type="title"/>
-          </p:nvPr>
-        </p:nvSpPr>
-        <p:spPr/>
-        <p:txBody>
-          <a:bodyPr/>
-          <a:lstStyle/>
-          <a:p>
-            <a:r>
-              <a:rPr lang="en-IN" dirty="0"/>
-              <a:t>Hello</a:t>
-            </a:r>
-            <a:br>
-              <a:rPr lang="en-IN" dirty="0"/>
-            </a:br>
-            <a:endParaRPr lang="en-IN" dirty="0"/>
-          </a:p>
-        </p:txBody>
-      </p:sp>
-      <p:sp>
-        <p:nvSpPr>
-          <p:cNvPr id="3" name="Content Placeholder 2">
-            <a:extLst>
-              <a:ext uri="{FF2B5EF4-FFF2-40B4-BE49-F238E27FC236}">
-                <a16:creationId xmlns:a16="http://schemas.microsoft.com/office/drawing/2014/main" id="{C4887F2C-D44B-55A0-1C7C-4492BB09AE3E}"/>
-              </a:ext>
-            </a:extLst>
-          </p:cNvPr>
-          <p:cNvSpPr>
-            <a:spLocks noGrp="1"/>
-          </p:cNvSpPr>
-          <p:nvPr>
-            <p:ph idx="1"/>
-          </p:nvPr>
-        </p:nvSpPr>
-        <p:spPr/>
-        <p:txBody>
-          <a:bodyPr/>
-          <a:lstStyle/>
-          <a:p>
-            <a:endParaRPr lang="en-IN"/>
-          </a:p>
-        </p:txBody>
-      </p:sp>
-    </p:spTree>
-    <p:extLst>
-      <p:ext uri="{BB962C8B-B14F-4D97-AF65-F5344CB8AC3E}">
-        <p14:creationId xmlns:p14="http://schemas.microsoft.com/office/powerpoint/2010/main" val="3210410679"/>
       </p:ext>
     </p:extLst>
   </p:cSld>

</xml_diff>